<commit_message>
adding process particle filter
</commit_message>
<xml_diff>
--- a/img/model_diagram.pptx
+++ b/img/model_diagram.pptx
@@ -3380,7 +3380,7 @@
         </p:nvSpPr>
         <p:spPr>
           <a:xfrm>
-            <a:off x="5217881" y="2483477"/>
+            <a:off x="5203167" y="2409062"/>
             <a:ext cx="639919" cy="369332"/>
           </a:xfrm>
           <a:prstGeom prst="rect">
@@ -3464,7 +3464,7 @@
         <p:spPr>
           <a:xfrm>
             <a:off x="4372085" y="2130198"/>
-            <a:ext cx="1165756" cy="353279"/>
+            <a:ext cx="1151042" cy="278864"/>
           </a:xfrm>
           <a:prstGeom prst="bentConnector2">
             <a:avLst/>
@@ -3509,8 +3509,8 @@
         </p:nvCxnSpPr>
         <p:spPr>
           <a:xfrm flipV="1">
-            <a:off x="4305977" y="2852809"/>
-            <a:ext cx="1231864" cy="184666"/>
+            <a:off x="4305977" y="2778394"/>
+            <a:ext cx="1217150" cy="259081"/>
           </a:xfrm>
           <a:prstGeom prst="bentConnector2">
             <a:avLst/>
@@ -3754,13 +3754,14 @@
           </p:cNvPr>
           <p:cNvCxnSpPr>
             <a:cxnSpLocks/>
+            <a:endCxn id="36" idx="2"/>
           </p:cNvCxnSpPr>
           <p:nvPr/>
         </p:nvCxnSpPr>
         <p:spPr>
           <a:xfrm flipV="1">
-            <a:off x="5706419" y="1655215"/>
-            <a:ext cx="0" cy="827156"/>
+            <a:off x="5681833" y="1704213"/>
+            <a:ext cx="0" cy="704849"/>
           </a:xfrm>
           <a:prstGeom prst="straightConnector1">
             <a:avLst/>
@@ -3924,7 +3925,7 @@
         </p:nvSpPr>
         <p:spPr>
           <a:xfrm>
-            <a:off x="1881087" y="3311611"/>
+            <a:off x="2247782" y="3334740"/>
             <a:ext cx="441981" cy="345989"/>
           </a:xfrm>
           <a:prstGeom prst="rect">
@@ -3976,7 +3977,7 @@
         </p:nvSpPr>
         <p:spPr>
           <a:xfrm>
-            <a:off x="1731444" y="3599475"/>
+            <a:off x="2098139" y="3622604"/>
             <a:ext cx="734112" cy="369332"/>
           </a:xfrm>
           <a:prstGeom prst="rect">
@@ -4013,7 +4014,7 @@
         </p:nvCxnSpPr>
         <p:spPr>
           <a:xfrm>
-            <a:off x="2756625" y="3491214"/>
+            <a:off x="3123320" y="3514343"/>
             <a:ext cx="628794" cy="0"/>
           </a:xfrm>
           <a:prstGeom prst="straightConnector1">
@@ -4055,7 +4056,7 @@
         </p:nvSpPr>
         <p:spPr>
           <a:xfrm>
-            <a:off x="2657029" y="3612731"/>
+            <a:off x="3023724" y="3635860"/>
             <a:ext cx="728405" cy="369332"/>
           </a:xfrm>
           <a:prstGeom prst="rect">
@@ -4517,7 +4518,7 @@
         </p:nvSpPr>
         <p:spPr>
           <a:xfrm>
-            <a:off x="3046326" y="547958"/>
+            <a:off x="3046326" y="671528"/>
             <a:ext cx="2042547" cy="369332"/>
           </a:xfrm>
           <a:prstGeom prst="rect">
@@ -4554,7 +4555,7 @@
         </p:nvCxnSpPr>
         <p:spPr>
           <a:xfrm>
-            <a:off x="5366740" y="3483244"/>
+            <a:off x="5275388" y="3509750"/>
             <a:ext cx="381362" cy="0"/>
           </a:xfrm>
           <a:prstGeom prst="line">
@@ -4565,6 +4566,7 @@
               <a:schemeClr val="tx1"/>
             </a:solidFill>
             <a:prstDash val="dash"/>
+            <a:tailEnd type="triangle"/>
           </a:ln>
         </p:spPr>
         <p:style>
@@ -4596,8 +4598,8 @@
         </p:nvSpPr>
         <p:spPr>
           <a:xfrm>
-            <a:off x="4814750" y="3591436"/>
-            <a:ext cx="1485342" cy="923330"/>
+            <a:off x="4837694" y="3617942"/>
+            <a:ext cx="1256754" cy="923330"/>
           </a:xfrm>
           <a:prstGeom prst="rect">
             <a:avLst/>
@@ -4620,14 +4622,14 @@
             <a:pPr algn="ctr"/>
             <a:r>
               <a:rPr lang="en-US" dirty="0"/>
-              <a:t>(no exchange </a:t>
+              <a:t>(no carbon </a:t>
             </a:r>
           </a:p>
           <a:p>
             <a:pPr algn="ctr"/>
             <a:r>
               <a:rPr lang="en-US" dirty="0"/>
-              <a:t>of matter)</a:t>
+              <a:t>exchange)</a:t>
             </a:r>
           </a:p>
         </p:txBody>

</xml_diff>